<commit_message>
Commit - modification du 26.06.2017
Modification présentation
</commit_message>
<xml_diff>
--- a/PRESENTATION/DémoMot.pptx
+++ b/PRESENTATION/DémoMot.pptx
@@ -5,10 +5,10 @@
     <p:sldMasterId id="2147483648" r:id="rId1"/>
   </p:sldMasterIdLst>
   <p:notesMasterIdLst>
-    <p:notesMasterId r:id="rId10"/>
+    <p:notesMasterId r:id="rId12"/>
   </p:notesMasterIdLst>
   <p:handoutMasterIdLst>
-    <p:handoutMasterId r:id="rId11"/>
+    <p:handoutMasterId r:id="rId13"/>
   </p:handoutMasterIdLst>
   <p:sldIdLst>
     <p:sldId id="256" r:id="rId2"/>
@@ -17,8 +17,10 @@
     <p:sldId id="259" r:id="rId5"/>
     <p:sldId id="260" r:id="rId6"/>
     <p:sldId id="262" r:id="rId7"/>
-    <p:sldId id="263" r:id="rId8"/>
-    <p:sldId id="261" r:id="rId9"/>
+    <p:sldId id="264" r:id="rId8"/>
+    <p:sldId id="265" r:id="rId9"/>
+    <p:sldId id="263" r:id="rId10"/>
+    <p:sldId id="261" r:id="rId11"/>
   </p:sldIdLst>
   <p:sldSz cx="12192000" cy="6858000"/>
   <p:notesSz cx="6858000" cy="9144000"/>
@@ -117,6 +119,11 @@
       </a:defRPr>
     </a:lvl9pPr>
   </p:defaultTextStyle>
+  <p:extLst>
+    <p:ext uri="{EFAFB233-063F-42B5-8137-9DF3F51BA10A}">
+      <p15:sldGuideLst xmlns:p15="http://schemas.microsoft.com/office/powerpoint/2012/main"/>
+    </p:ext>
+  </p:extLst>
 </p:presentation>
 </file>
 
@@ -202,7 +209,7 @@
           <a:p>
             <a:fld id="{2D844B6F-7CDD-40E2-B6A5-DD76076AA672}" type="datetimeFigureOut">
               <a:rPr lang="fr-CH" smtClean="0"/>
-              <a:t>26.06.2017</a:t>
+              <a:t>27.06.2017</a:t>
             </a:fld>
             <a:endParaRPr lang="fr-CH"/>
           </a:p>
@@ -368,7 +375,7 @@
           <a:p>
             <a:fld id="{2A81071B-2E02-4919-A619-1AA5609DFF2B}" type="datetimeFigureOut">
               <a:rPr lang="fr-CH" smtClean="0"/>
-              <a:t>26.06.2017</a:t>
+              <a:t>27.06.2017</a:t>
             </a:fld>
             <a:endParaRPr lang="fr-CH"/>
           </a:p>
@@ -981,7 +988,7 @@
           <a:p>
             <a:fld id="{A1D89DC4-B5DD-4D60-8991-CFD700A3CF91}" type="slidenum">
               <a:rPr lang="fr-CH" smtClean="0"/>
-              <a:t>7</a:t>
+              <a:t>9</a:t>
             </a:fld>
             <a:endParaRPr lang="fr-CH"/>
           </a:p>
@@ -1272,9 +1279,9 @@
           <a:bodyPr/>
           <a:lstStyle/>
           <a:p>
-            <a:fld id="{DFADDAC0-B580-480D-B895-855E9E6E1519}" type="datetime1">
+            <a:fld id="{C0C1A069-709C-4E2F-B6D8-C429FFC7084B}" type="datetime1">
               <a:rPr lang="en-US" smtClean="0"/>
-              <a:t>6/26/2017</a:t>
+              <a:t>6/27/2017</a:t>
             </a:fld>
             <a:endParaRPr lang="en-US" dirty="0"/>
           </a:p>
@@ -1685,9 +1692,9 @@
           <a:bodyPr/>
           <a:lstStyle/>
           <a:p>
-            <a:fld id="{721D52C8-8926-4CBF-A038-492C191C2475}" type="datetime1">
+            <a:fld id="{447A77F1-21C7-459B-9B0B-B05BBB26C161}" type="datetime1">
               <a:rPr lang="en-US" smtClean="0"/>
-              <a:t>6/26/2017</a:t>
+              <a:t>6/27/2017</a:t>
             </a:fld>
             <a:endParaRPr lang="en-US" dirty="0"/>
           </a:p>
@@ -2020,9 +2027,9 @@
           <a:bodyPr/>
           <a:lstStyle/>
           <a:p>
-            <a:fld id="{3A0ECE2D-DD9B-41BA-816E-51E7584F6402}" type="datetime1">
+            <a:fld id="{66E7E8D0-B5C6-4FEE-8D7E-1AECCA7122BF}" type="datetime1">
               <a:rPr lang="en-US" smtClean="0"/>
-              <a:t>6/26/2017</a:t>
+              <a:t>6/27/2017</a:t>
             </a:fld>
             <a:endParaRPr lang="en-US" dirty="0"/>
           </a:p>
@@ -2424,9 +2431,9 @@
           <a:bodyPr/>
           <a:lstStyle/>
           <a:p>
-            <a:fld id="{E0F25C0D-EA60-4683-BAB8-4742C08F04F9}" type="datetime1">
+            <a:fld id="{8896A620-D26B-4271-811F-2117E80A87E8}" type="datetime1">
               <a:rPr lang="en-US" smtClean="0"/>
-              <a:t>6/26/2017</a:t>
+              <a:t>6/27/2017</a:t>
             </a:fld>
             <a:endParaRPr lang="en-US" dirty="0"/>
           </a:p>
@@ -2991,9 +2998,9 @@
           <a:bodyPr/>
           <a:lstStyle/>
           <a:p>
-            <a:fld id="{2645382B-B20B-41E5-B6E8-81A7BCC077FD}" type="datetime1">
+            <a:fld id="{80AC09C9-4861-4E05-AC9D-0162762FF984}" type="datetime1">
               <a:rPr lang="en-US" smtClean="0"/>
-              <a:t>6/26/2017</a:t>
+              <a:t>6/27/2017</a:t>
             </a:fld>
             <a:endParaRPr lang="en-US" dirty="0"/>
           </a:p>
@@ -3671,9 +3678,9 @@
           <a:bodyPr/>
           <a:lstStyle/>
           <a:p>
-            <a:fld id="{D35BB681-6D15-4B5C-945E-B30B5584FE44}" type="datetime1">
+            <a:fld id="{B76D4797-6AD7-45B6-A37A-153AAA70DFBA}" type="datetime1">
               <a:rPr lang="en-US" smtClean="0"/>
-              <a:t>6/26/2017</a:t>
+              <a:t>6/27/2017</a:t>
             </a:fld>
             <a:endParaRPr lang="en-US" dirty="0"/>
           </a:p>
@@ -4583,9 +4590,9 @@
           <a:bodyPr/>
           <a:lstStyle/>
           <a:p>
-            <a:fld id="{772B7B49-1612-45A7-9A7D-6D12D54B2946}" type="datetime1">
+            <a:fld id="{A16BC744-2951-443F-A8FA-39E8E3921210}" type="datetime1">
               <a:rPr lang="en-US" smtClean="0"/>
-              <a:t>6/26/2017</a:t>
+              <a:t>6/27/2017</a:t>
             </a:fld>
             <a:endParaRPr lang="en-US" dirty="0"/>
           </a:p>
@@ -4895,9 +4902,9 @@
           <a:bodyPr/>
           <a:lstStyle/>
           <a:p>
-            <a:fld id="{29C23F5A-33DA-4D6C-B74C-B145496C555A}" type="datetime1">
+            <a:fld id="{2DB478A8-F1AF-49A3-AED2-2042196D8CA4}" type="datetime1">
               <a:rPr lang="en-US" smtClean="0"/>
-              <a:t>6/26/2017</a:t>
+              <a:t>6/27/2017</a:t>
             </a:fld>
             <a:endParaRPr lang="en-US" dirty="0"/>
           </a:p>
@@ -5158,9 +5165,9 @@
           <a:bodyPr/>
           <a:lstStyle/>
           <a:p>
-            <a:fld id="{119E4C7F-2878-4F32-82A3-EC2EDD5A9545}" type="datetime1">
+            <a:fld id="{726B28BB-7889-4BF9-889D-C4877D41F0ED}" type="datetime1">
               <a:rPr lang="en-US" smtClean="0"/>
-              <a:t>6/26/2017</a:t>
+              <a:t>6/27/2017</a:t>
             </a:fld>
             <a:endParaRPr lang="en-US" dirty="0"/>
           </a:p>
@@ -5481,9 +5488,9 @@
           <a:bodyPr/>
           <a:lstStyle/>
           <a:p>
-            <a:fld id="{6DFB8B54-957F-461B-8D68-FB1DAD9CB515}" type="datetime1">
+            <a:fld id="{1A6FCE56-93B7-437D-B87D-2BEE4ED92BAE}" type="datetime1">
               <a:rPr lang="en-US" smtClean="0"/>
-              <a:t>6/26/2017</a:t>
+              <a:t>6/27/2017</a:t>
             </a:fld>
             <a:endParaRPr lang="en-US" dirty="0"/>
           </a:p>
@@ -5869,9 +5876,9 @@
           <a:bodyPr/>
           <a:lstStyle/>
           <a:p>
-            <a:fld id="{927DB1A8-022D-43C3-99E1-3BE9B7A90077}" type="datetime1">
+            <a:fld id="{A2641243-69A9-40CB-9201-6B7B2E6452F4}" type="datetime1">
               <a:rPr lang="en-US" smtClean="0"/>
-              <a:t>6/26/2017</a:t>
+              <a:t>6/27/2017</a:t>
             </a:fld>
             <a:endParaRPr lang="en-US" dirty="0"/>
           </a:p>
@@ -6244,9 +6251,9 @@
           <a:bodyPr/>
           <a:lstStyle/>
           <a:p>
-            <a:fld id="{A5533BBF-FB44-4E11-8354-321A5CC7D104}" type="datetime1">
+            <a:fld id="{1034A1A2-F305-427E-892E-7EABFD15CEA3}" type="datetime1">
               <a:rPr lang="en-US" smtClean="0"/>
-              <a:t>6/26/2017</a:t>
+              <a:t>6/27/2017</a:t>
             </a:fld>
             <a:endParaRPr lang="en-US" dirty="0"/>
           </a:p>
@@ -6749,9 +6756,9 @@
           <a:bodyPr/>
           <a:lstStyle/>
           <a:p>
-            <a:fld id="{402114C2-F5A5-482B-8D91-DFA56C3D0B28}" type="datetime1">
+            <a:fld id="{A5867996-84FE-4F0A-A96A-D7D292144789}" type="datetime1">
               <a:rPr lang="en-US" smtClean="0"/>
-              <a:t>6/26/2017</a:t>
+              <a:t>6/27/2017</a:t>
             </a:fld>
             <a:endParaRPr lang="en-US" dirty="0"/>
           </a:p>
@@ -7005,9 +7012,9 @@
           <a:bodyPr/>
           <a:lstStyle/>
           <a:p>
-            <a:fld id="{6F376C90-BC0A-48FA-962F-9AB0C563FC15}" type="datetime1">
+            <a:fld id="{22D13088-D19A-46B4-8609-2131CB0E097E}" type="datetime1">
               <a:rPr lang="en-US" smtClean="0"/>
-              <a:t>6/26/2017</a:t>
+              <a:t>6/27/2017</a:t>
             </a:fld>
             <a:endParaRPr lang="en-US" dirty="0"/>
           </a:p>
@@ -7167,9 +7174,9 @@
           <a:bodyPr/>
           <a:lstStyle/>
           <a:p>
-            <a:fld id="{60D7F358-3FF3-411F-BE4D-E4C6A3D83D98}" type="datetime1">
+            <a:fld id="{1A147DA2-4D9E-491A-8B31-17E2AD347286}" type="datetime1">
               <a:rPr lang="en-US" smtClean="0"/>
-              <a:t>6/26/2017</a:t>
+              <a:t>6/27/2017</a:t>
             </a:fld>
             <a:endParaRPr lang="en-US" dirty="0"/>
           </a:p>
@@ -7556,9 +7563,9 @@
           <a:bodyPr/>
           <a:lstStyle/>
           <a:p>
-            <a:fld id="{4F316B82-825F-44AE-8E76-044F41CC262D}" type="datetime1">
+            <a:fld id="{B58E204E-2982-429B-844B-D8A813CB31D0}" type="datetime1">
               <a:rPr lang="en-US" smtClean="0"/>
-              <a:t>6/26/2017</a:t>
+              <a:t>6/27/2017</a:t>
             </a:fld>
             <a:endParaRPr lang="en-US" dirty="0"/>
           </a:p>
@@ -7964,9 +7971,9 @@
           <a:bodyPr/>
           <a:lstStyle/>
           <a:p>
-            <a:fld id="{643F79C8-ED42-4CBE-8EE7-4F80E975140D}" type="datetime1">
+            <a:fld id="{428C2242-FD5E-4CFB-A70A-5B6C20D0FC6B}" type="datetime1">
               <a:rPr lang="en-US" smtClean="0"/>
-              <a:t>6/26/2017</a:t>
+              <a:t>6/27/2017</a:t>
             </a:fld>
             <a:endParaRPr lang="en-US" dirty="0"/>
           </a:p>
@@ -8207,9 +8214,9 @@
             </a:lvl1pPr>
           </a:lstStyle>
           <a:p>
-            <a:fld id="{CBD6181B-B531-467D-9DB3-03B68741D6DC}" type="datetime1">
+            <a:fld id="{65B81045-5ABD-4598-B2A2-39B8959AEDD0}" type="datetime1">
               <a:rPr lang="en-US" smtClean="0"/>
-              <a:t>6/26/2017</a:t>
+              <a:t>6/27/2017</a:t>
             </a:fld>
             <a:endParaRPr lang="en-US" dirty="0"/>
           </a:p>
@@ -8687,6 +8694,145 @@
 </p:sld>
 </file>
 
+<file path=ppt/slides/slide10.xml><?xml version="1.0" encoding="utf-8"?>
+<p:sld xmlns:a="http://schemas.openxmlformats.org/drawingml/2006/main" xmlns:r="http://schemas.openxmlformats.org/officeDocument/2006/relationships" xmlns:p="http://schemas.openxmlformats.org/presentationml/2006/main">
+  <p:cSld>
+    <p:spTree>
+      <p:nvGrpSpPr>
+        <p:cNvPr id="1" name=""/>
+        <p:cNvGrpSpPr/>
+        <p:nvPr/>
+      </p:nvGrpSpPr>
+      <p:grpSpPr>
+        <a:xfrm>
+          <a:off x="0" y="0"/>
+          <a:ext cx="0" cy="0"/>
+          <a:chOff x="0" y="0"/>
+          <a:chExt cx="0" cy="0"/>
+        </a:xfrm>
+      </p:grpSpPr>
+      <p:sp>
+        <p:nvSpPr>
+          <p:cNvPr id="2" name="Titre 1"/>
+          <p:cNvSpPr>
+            <a:spLocks noGrp="1"/>
+          </p:cNvSpPr>
+          <p:nvPr>
+            <p:ph type="title"/>
+          </p:nvPr>
+        </p:nvSpPr>
+        <p:spPr/>
+        <p:txBody>
+          <a:bodyPr/>
+          <a:lstStyle/>
+          <a:p>
+            <a:r>
+              <a:rPr lang="fr-CH" dirty="0" smtClean="0"/>
+              <a:t>Question ?</a:t>
+            </a:r>
+            <a:endParaRPr lang="fr-CH" dirty="0"/>
+          </a:p>
+        </p:txBody>
+      </p:sp>
+      <p:sp>
+        <p:nvSpPr>
+          <p:cNvPr id="3" name="Espace réservé du pied de page 2"/>
+          <p:cNvSpPr>
+            <a:spLocks noGrp="1"/>
+          </p:cNvSpPr>
+          <p:nvPr>
+            <p:ph type="ftr" sz="quarter" idx="11"/>
+          </p:nvPr>
+        </p:nvSpPr>
+        <p:spPr/>
+        <p:txBody>
+          <a:bodyPr/>
+          <a:lstStyle/>
+          <a:p>
+            <a:r>
+              <a:rPr lang="en-US" smtClean="0"/>
+              <a:t>Auteur : Jonathan Mayor </a:t>
+            </a:r>
+            <a:endParaRPr lang="en-US" dirty="0"/>
+          </a:p>
+        </p:txBody>
+      </p:sp>
+      <p:sp>
+        <p:nvSpPr>
+          <p:cNvPr id="4" name="Espace réservé du numéro de diapositive 3"/>
+          <p:cNvSpPr>
+            <a:spLocks noGrp="1"/>
+          </p:cNvSpPr>
+          <p:nvPr>
+            <p:ph type="sldNum" sz="quarter" idx="12"/>
+          </p:nvPr>
+        </p:nvSpPr>
+        <p:spPr>
+          <a:xfrm>
+            <a:off x="10729455" y="753227"/>
+            <a:ext cx="1462545" cy="1090789"/>
+          </a:xfrm>
+        </p:spPr>
+        <p:txBody>
+          <a:bodyPr/>
+          <a:lstStyle/>
+          <a:p>
+            <a:fld id="{6D22F896-40B5-4ADD-8801-0D06FADFA095}" type="slidenum">
+              <a:rPr lang="en-US" smtClean="0"/>
+              <a:pPr/>
+              <a:t>10</a:t>
+            </a:fld>
+            <a:r>
+              <a:rPr lang="en-US" dirty="0" smtClean="0"/>
+              <a:t>/10</a:t>
+            </a:r>
+            <a:endParaRPr lang="en-US" dirty="0"/>
+          </a:p>
+        </p:txBody>
+      </p:sp>
+      <p:sp>
+        <p:nvSpPr>
+          <p:cNvPr id="5" name="Espace réservé de la date 4"/>
+          <p:cNvSpPr>
+            <a:spLocks noGrp="1"/>
+          </p:cNvSpPr>
+          <p:nvPr>
+            <p:ph type="dt" sz="half" idx="10"/>
+          </p:nvPr>
+        </p:nvSpPr>
+        <p:spPr/>
+        <p:txBody>
+          <a:bodyPr/>
+          <a:lstStyle/>
+          <a:p>
+            <a:fld id="{44206163-DA0D-43DD-8FD6-9AB219777C9E}" type="datetime1">
+              <a:rPr lang="en-US" smtClean="0"/>
+              <a:t>6/27/2017</a:t>
+            </a:fld>
+            <a:endParaRPr lang="en-US" dirty="0"/>
+          </a:p>
+        </p:txBody>
+      </p:sp>
+    </p:spTree>
+    <p:extLst>
+      <p:ext uri="{BB962C8B-B14F-4D97-AF65-F5344CB8AC3E}">
+        <p14:creationId xmlns:p14="http://schemas.microsoft.com/office/powerpoint/2010/main" val="1462199348"/>
+      </p:ext>
+    </p:extLst>
+  </p:cSld>
+  <p:clrMapOvr>
+    <a:masterClrMapping/>
+  </p:clrMapOvr>
+  <p:timing>
+    <p:tnLst>
+      <p:par>
+        <p:cTn id="1" dur="indefinite" restart="never" nodeType="tmRoot"/>
+      </p:par>
+    </p:tnLst>
+  </p:timing>
+</p:sld>
+</file>
+
 <file path=ppt/slides/slide2.xml><?xml version="1.0" encoding="utf-8"?>
 <p:sld xmlns:a="http://schemas.openxmlformats.org/drawingml/2006/main" xmlns:r="http://schemas.openxmlformats.org/officeDocument/2006/relationships" xmlns:p="http://schemas.openxmlformats.org/presentationml/2006/main">
   <p:cSld>
@@ -8739,7 +8885,9 @@
         </p:nvSpPr>
         <p:spPr/>
         <p:txBody>
-          <a:bodyPr/>
+          <a:bodyPr>
+            <a:normAutofit/>
+          </a:bodyPr>
           <a:lstStyle/>
           <a:p>
             <a:r>
@@ -8764,6 +8912,19 @@
               <a:rPr lang="fr-CH" dirty="0" smtClean="0"/>
               <a:t>JDT</a:t>
             </a:r>
+          </a:p>
+          <a:p>
+            <a:r>
+              <a:rPr lang="fr-CH" dirty="0" smtClean="0"/>
+              <a:t>GIT</a:t>
+            </a:r>
+            <a:endParaRPr lang="fr-CH" dirty="0" smtClean="0"/>
+          </a:p>
+          <a:p>
+            <a:r>
+              <a:rPr lang="fr-CH" dirty="0" smtClean="0"/>
+              <a:t>Conclusion</a:t>
+            </a:r>
             <a:endParaRPr lang="fr-CH" dirty="0"/>
           </a:p>
         </p:txBody>
@@ -8808,8 +8969,13 @@
           <a:p>
             <a:fld id="{6D22F896-40B5-4ADD-8801-0D06FADFA095}" type="slidenum">
               <a:rPr lang="en-US" smtClean="0"/>
+              <a:pPr/>
               <a:t>2</a:t>
             </a:fld>
+            <a:r>
+              <a:rPr lang="en-US" dirty="0" smtClean="0"/>
+              <a:t>/10</a:t>
+            </a:r>
             <a:endParaRPr lang="en-US" dirty="0"/>
           </a:p>
         </p:txBody>
@@ -8829,9 +8995,9 @@
           <a:bodyPr/>
           <a:lstStyle/>
           <a:p>
-            <a:fld id="{5897405E-2909-4FE9-8F71-5318435FFCEA}" type="datetime1">
+            <a:fld id="{BF5C4AFB-286C-47CF-A7A5-1EC8A18B3EC4}" type="datetime1">
               <a:rPr lang="en-US" smtClean="0"/>
-              <a:t>6/26/2017</a:t>
+              <a:t>6/27/2017</a:t>
             </a:fld>
             <a:endParaRPr lang="en-US" dirty="0"/>
           </a:p>
@@ -8920,7 +9086,11 @@
           <a:p>
             <a:r>
               <a:rPr lang="fr-CH" dirty="0" smtClean="0"/>
-              <a:t>Module 120</a:t>
+              <a:t>Module </a:t>
+            </a:r>
+            <a:r>
+              <a:rPr lang="fr-CH" dirty="0" smtClean="0"/>
+              <a:t>120</a:t>
             </a:r>
             <a:endParaRPr lang="fr-CH" dirty="0"/>
           </a:p>
@@ -8951,7 +9121,30 @@
       </p:sp>
       <p:sp>
         <p:nvSpPr>
-          <p:cNvPr id="5" name="Espace réservé du numéro de diapositive 4"/>
+          <p:cNvPr id="6" name="Espace réservé de la date 5"/>
+          <p:cNvSpPr>
+            <a:spLocks noGrp="1"/>
+          </p:cNvSpPr>
+          <p:nvPr>
+            <p:ph type="dt" sz="half" idx="10"/>
+          </p:nvPr>
+        </p:nvSpPr>
+        <p:spPr/>
+        <p:txBody>
+          <a:bodyPr/>
+          <a:lstStyle/>
+          <a:p>
+            <a:fld id="{CA71D031-EB1E-42E4-9B32-805F876F12AA}" type="datetime1">
+              <a:rPr lang="en-US" smtClean="0"/>
+              <a:t>6/27/2017</a:t>
+            </a:fld>
+            <a:endParaRPr lang="en-US" dirty="0"/>
+          </a:p>
+        </p:txBody>
+      </p:sp>
+      <p:sp>
+        <p:nvSpPr>
+          <p:cNvPr id="7" name="Espace réservé du numéro de diapositive 3"/>
           <p:cNvSpPr>
             <a:spLocks noGrp="1"/>
           </p:cNvSpPr>
@@ -8959,38 +9152,24 @@
             <p:ph type="sldNum" sz="quarter" idx="12"/>
           </p:nvPr>
         </p:nvSpPr>
-        <p:spPr/>
-        <p:txBody>
-          <a:bodyPr/>
-          <a:lstStyle/>
-          <a:p>
-            <a:fld id="{6D22F896-40B5-4ADD-8801-0D06FADFA095}" type="slidenum">
-              <a:rPr lang="en-US" smtClean="0"/>
+        <p:spPr>
+          <a:xfrm>
+            <a:off x="10729455" y="753227"/>
+            <a:ext cx="1462545" cy="1090789"/>
+          </a:xfrm>
+        </p:spPr>
+        <p:txBody>
+          <a:bodyPr/>
+          <a:lstStyle/>
+          <a:p>
+            <a:r>
+              <a:rPr lang="en-US" dirty="0" smtClean="0"/>
               <a:t>3</a:t>
-            </a:fld>
-            <a:endParaRPr lang="en-US" dirty="0"/>
-          </a:p>
-        </p:txBody>
-      </p:sp>
-      <p:sp>
-        <p:nvSpPr>
-          <p:cNvPr id="6" name="Espace réservé de la date 5"/>
-          <p:cNvSpPr>
-            <a:spLocks noGrp="1"/>
-          </p:cNvSpPr>
-          <p:nvPr>
-            <p:ph type="dt" sz="half" idx="10"/>
-          </p:nvPr>
-        </p:nvSpPr>
-        <p:spPr/>
-        <p:txBody>
-          <a:bodyPr/>
-          <a:lstStyle/>
-          <a:p>
-            <a:fld id="{ADB57F41-84A7-4188-AED7-1BF3D6A62143}" type="datetime1">
-              <a:rPr lang="en-US" smtClean="0"/>
-              <a:t>6/26/2017</a:t>
-            </a:fld>
+            </a:r>
+            <a:r>
+              <a:rPr lang="en-US" dirty="0" smtClean="0"/>
+              <a:t>/10</a:t>
+            </a:r>
             <a:endParaRPr lang="en-US" dirty="0"/>
           </a:p>
         </p:txBody>
@@ -9133,7 +9312,30 @@
       </p:sp>
       <p:sp>
         <p:nvSpPr>
-          <p:cNvPr id="5" name="Espace réservé du numéro de diapositive 4"/>
+          <p:cNvPr id="6" name="Espace réservé de la date 5"/>
+          <p:cNvSpPr>
+            <a:spLocks noGrp="1"/>
+          </p:cNvSpPr>
+          <p:nvPr>
+            <p:ph type="dt" sz="half" idx="10"/>
+          </p:nvPr>
+        </p:nvSpPr>
+        <p:spPr/>
+        <p:txBody>
+          <a:bodyPr/>
+          <a:lstStyle/>
+          <a:p>
+            <a:fld id="{DCCF1201-4152-4832-81AB-521393BFB9F1}" type="datetime1">
+              <a:rPr lang="en-US" smtClean="0"/>
+              <a:t>6/27/2017</a:t>
+            </a:fld>
+            <a:endParaRPr lang="en-US" dirty="0"/>
+          </a:p>
+        </p:txBody>
+      </p:sp>
+      <p:sp>
+        <p:nvSpPr>
+          <p:cNvPr id="7" name="Espace réservé du numéro de diapositive 3"/>
           <p:cNvSpPr>
             <a:spLocks noGrp="1"/>
           </p:cNvSpPr>
@@ -9141,38 +9343,24 @@
             <p:ph type="sldNum" sz="quarter" idx="12"/>
           </p:nvPr>
         </p:nvSpPr>
-        <p:spPr/>
-        <p:txBody>
-          <a:bodyPr/>
-          <a:lstStyle/>
-          <a:p>
-            <a:fld id="{6D22F896-40B5-4ADD-8801-0D06FADFA095}" type="slidenum">
-              <a:rPr lang="en-US" smtClean="0"/>
+        <p:spPr>
+          <a:xfrm>
+            <a:off x="10729455" y="753227"/>
+            <a:ext cx="1462545" cy="1090789"/>
+          </a:xfrm>
+        </p:spPr>
+        <p:txBody>
+          <a:bodyPr/>
+          <a:lstStyle/>
+          <a:p>
+            <a:r>
+              <a:rPr lang="en-US" dirty="0" smtClean="0"/>
               <a:t>4</a:t>
-            </a:fld>
-            <a:endParaRPr lang="en-US" dirty="0"/>
-          </a:p>
-        </p:txBody>
-      </p:sp>
-      <p:sp>
-        <p:nvSpPr>
-          <p:cNvPr id="6" name="Espace réservé de la date 5"/>
-          <p:cNvSpPr>
-            <a:spLocks noGrp="1"/>
-          </p:cNvSpPr>
-          <p:nvPr>
-            <p:ph type="dt" sz="half" idx="10"/>
-          </p:nvPr>
-        </p:nvSpPr>
-        <p:spPr/>
-        <p:txBody>
-          <a:bodyPr/>
-          <a:lstStyle/>
-          <a:p>
-            <a:fld id="{37C3903B-BB02-4E53-99A6-BC5B8A644E78}" type="datetime1">
-              <a:rPr lang="en-US" smtClean="0"/>
-              <a:t>6/26/2017</a:t>
-            </a:fld>
+            </a:r>
+            <a:r>
+              <a:rPr lang="en-US" dirty="0" smtClean="0"/>
+              <a:t>/10</a:t>
+            </a:r>
             <a:endParaRPr lang="en-US" dirty="0"/>
           </a:p>
         </p:txBody>
@@ -9187,6 +9375,13 @@
   <p:clrMapOvr>
     <a:masterClrMapping/>
   </p:clrMapOvr>
+  <p:timing>
+    <p:tnLst>
+      <p:par>
+        <p:cTn id="1" dur="indefinite" restart="never" nodeType="tmRoot"/>
+      </p:par>
+    </p:tnLst>
+  </p:timing>
 </p:sld>
 </file>
 
@@ -9314,7 +9509,30 @@
       </p:sp>
       <p:sp>
         <p:nvSpPr>
-          <p:cNvPr id="5" name="Espace réservé du numéro de diapositive 4"/>
+          <p:cNvPr id="6" name="Espace réservé de la date 5"/>
+          <p:cNvSpPr>
+            <a:spLocks noGrp="1"/>
+          </p:cNvSpPr>
+          <p:nvPr>
+            <p:ph type="dt" sz="half" idx="10"/>
+          </p:nvPr>
+        </p:nvSpPr>
+        <p:spPr/>
+        <p:txBody>
+          <a:bodyPr/>
+          <a:lstStyle/>
+          <a:p>
+            <a:fld id="{AFBE351F-0542-4651-98D8-5B905FB582CB}" type="datetime1">
+              <a:rPr lang="en-US" smtClean="0"/>
+              <a:t>6/27/2017</a:t>
+            </a:fld>
+            <a:endParaRPr lang="en-US" dirty="0"/>
+          </a:p>
+        </p:txBody>
+      </p:sp>
+      <p:sp>
+        <p:nvSpPr>
+          <p:cNvPr id="7" name="Espace réservé du numéro de diapositive 3"/>
           <p:cNvSpPr>
             <a:spLocks noGrp="1"/>
           </p:cNvSpPr>
@@ -9322,38 +9540,24 @@
             <p:ph type="sldNum" sz="quarter" idx="12"/>
           </p:nvPr>
         </p:nvSpPr>
-        <p:spPr/>
-        <p:txBody>
-          <a:bodyPr/>
-          <a:lstStyle/>
-          <a:p>
-            <a:fld id="{6D22F896-40B5-4ADD-8801-0D06FADFA095}" type="slidenum">
-              <a:rPr lang="en-US" smtClean="0"/>
+        <p:spPr>
+          <a:xfrm>
+            <a:off x="10729455" y="753227"/>
+            <a:ext cx="1462545" cy="1090789"/>
+          </a:xfrm>
+        </p:spPr>
+        <p:txBody>
+          <a:bodyPr/>
+          <a:lstStyle/>
+          <a:p>
+            <a:r>
+              <a:rPr lang="en-US" dirty="0" smtClean="0"/>
               <a:t>5</a:t>
-            </a:fld>
-            <a:endParaRPr lang="en-US" dirty="0"/>
-          </a:p>
-        </p:txBody>
-      </p:sp>
-      <p:sp>
-        <p:nvSpPr>
-          <p:cNvPr id="6" name="Espace réservé de la date 5"/>
-          <p:cNvSpPr>
-            <a:spLocks noGrp="1"/>
-          </p:cNvSpPr>
-          <p:nvPr>
-            <p:ph type="dt" sz="half" idx="10"/>
-          </p:nvPr>
-        </p:nvSpPr>
-        <p:spPr/>
-        <p:txBody>
-          <a:bodyPr/>
-          <a:lstStyle/>
-          <a:p>
-            <a:fld id="{2D94F9B9-4144-4119-9DAD-189629A0E910}" type="datetime1">
-              <a:rPr lang="en-US" smtClean="0"/>
-              <a:t>6/26/2017</a:t>
-            </a:fld>
+            </a:r>
+            <a:r>
+              <a:rPr lang="en-US" dirty="0" smtClean="0"/>
+              <a:t>/10</a:t>
+            </a:r>
             <a:endParaRPr lang="en-US" dirty="0"/>
           </a:p>
         </p:txBody>
@@ -9418,9 +9622,55 @@
           </a:p>
         </p:txBody>
       </p:sp>
+      <p:sp>
+        <p:nvSpPr>
+          <p:cNvPr id="5" name="Espace réservé du pied de page 4"/>
+          <p:cNvSpPr>
+            <a:spLocks noGrp="1"/>
+          </p:cNvSpPr>
+          <p:nvPr>
+            <p:ph type="ftr" sz="quarter" idx="11"/>
+          </p:nvPr>
+        </p:nvSpPr>
+        <p:spPr/>
+        <p:txBody>
+          <a:bodyPr/>
+          <a:lstStyle/>
+          <a:p>
+            <a:r>
+              <a:rPr lang="en-US" smtClean="0"/>
+              <a:t>Auteur : Jonathan Mayor </a:t>
+            </a:r>
+            <a:endParaRPr lang="en-US" dirty="0"/>
+          </a:p>
+        </p:txBody>
+      </p:sp>
+      <p:sp>
+        <p:nvSpPr>
+          <p:cNvPr id="7" name="Espace réservé de la date 6"/>
+          <p:cNvSpPr>
+            <a:spLocks noGrp="1"/>
+          </p:cNvSpPr>
+          <p:nvPr>
+            <p:ph type="dt" sz="half" idx="10"/>
+          </p:nvPr>
+        </p:nvSpPr>
+        <p:spPr/>
+        <p:txBody>
+          <a:bodyPr/>
+          <a:lstStyle/>
+          <a:p>
+            <a:fld id="{5B314F55-F7EE-4E63-B46C-A3C1A9ADCB0F}" type="datetime1">
+              <a:rPr lang="en-US" smtClean="0"/>
+              <a:t>6/27/2017</a:t>
+            </a:fld>
+            <a:endParaRPr lang="en-US" dirty="0"/>
+          </a:p>
+        </p:txBody>
+      </p:sp>
       <p:pic>
         <p:nvPicPr>
-          <p:cNvPr id="4" name="Espace réservé du contenu 3"/>
+          <p:cNvPr id="10" name="Espace réservé du contenu 9"/>
           <p:cNvPicPr>
             <a:picLocks noGrp="1" noChangeAspect="1"/>
           </p:cNvPicPr>
@@ -9442,37 +9692,14 @@
         </p:blipFill>
         <p:spPr>
           <a:xfrm>
-            <a:off x="681038" y="3630027"/>
-            <a:ext cx="9613900" cy="1012409"/>
+            <a:off x="681038" y="2773398"/>
+            <a:ext cx="9613900" cy="2725666"/>
           </a:xfrm>
         </p:spPr>
       </p:pic>
       <p:sp>
         <p:nvSpPr>
-          <p:cNvPr id="5" name="Espace réservé du pied de page 4"/>
-          <p:cNvSpPr>
-            <a:spLocks noGrp="1"/>
-          </p:cNvSpPr>
-          <p:nvPr>
-            <p:ph type="ftr" sz="quarter" idx="11"/>
-          </p:nvPr>
-        </p:nvSpPr>
-        <p:spPr/>
-        <p:txBody>
-          <a:bodyPr/>
-          <a:lstStyle/>
-          <a:p>
-            <a:r>
-              <a:rPr lang="en-US" smtClean="0"/>
-              <a:t>Auteur : Jonathan Mayor </a:t>
-            </a:r>
-            <a:endParaRPr lang="en-US" dirty="0"/>
-          </a:p>
-        </p:txBody>
-      </p:sp>
-      <p:sp>
-        <p:nvSpPr>
-          <p:cNvPr id="6" name="Espace réservé du numéro de diapositive 5"/>
+          <p:cNvPr id="11" name="Espace réservé du numéro de diapositive 3"/>
           <p:cNvSpPr>
             <a:spLocks noGrp="1"/>
           </p:cNvSpPr>
@@ -9480,38 +9707,24 @@
             <p:ph type="sldNum" sz="quarter" idx="12"/>
           </p:nvPr>
         </p:nvSpPr>
-        <p:spPr/>
-        <p:txBody>
-          <a:bodyPr/>
-          <a:lstStyle/>
-          <a:p>
-            <a:fld id="{6D22F896-40B5-4ADD-8801-0D06FADFA095}" type="slidenum">
-              <a:rPr lang="en-US" smtClean="0"/>
+        <p:spPr>
+          <a:xfrm>
+            <a:off x="10729455" y="753227"/>
+            <a:ext cx="1462545" cy="1090789"/>
+          </a:xfrm>
+        </p:spPr>
+        <p:txBody>
+          <a:bodyPr/>
+          <a:lstStyle/>
+          <a:p>
+            <a:r>
+              <a:rPr lang="en-US" dirty="0" smtClean="0"/>
               <a:t>6</a:t>
-            </a:fld>
-            <a:endParaRPr lang="en-US" dirty="0"/>
-          </a:p>
-        </p:txBody>
-      </p:sp>
-      <p:sp>
-        <p:nvSpPr>
-          <p:cNvPr id="7" name="Espace réservé de la date 6"/>
-          <p:cNvSpPr>
-            <a:spLocks noGrp="1"/>
-          </p:cNvSpPr>
-          <p:nvPr>
-            <p:ph type="dt" sz="half" idx="10"/>
-          </p:nvPr>
-        </p:nvSpPr>
-        <p:spPr/>
-        <p:txBody>
-          <a:bodyPr/>
-          <a:lstStyle/>
-          <a:p>
-            <a:fld id="{59125F87-35A1-42EA-BD73-42CFAA91162F}" type="datetime1">
-              <a:rPr lang="en-US" smtClean="0"/>
-              <a:t>6/26/2017</a:t>
-            </a:fld>
+            </a:r>
+            <a:r>
+              <a:rPr lang="en-US" dirty="0" smtClean="0"/>
+              <a:t>/10</a:t>
+            </a:r>
             <a:endParaRPr lang="en-US" dirty="0"/>
           </a:p>
         </p:txBody>
@@ -9570,7 +9783,7 @@
           <a:p>
             <a:r>
               <a:rPr lang="fr-CH" dirty="0" smtClean="0"/>
-              <a:t>Conclusion</a:t>
+              <a:t>JDT</a:t>
             </a:r>
             <a:endParaRPr lang="fr-CH" dirty="0"/>
           </a:p>
@@ -9578,91 +9791,107 @@
       </p:sp>
       <p:sp>
         <p:nvSpPr>
+          <p:cNvPr id="5" name="Espace réservé du pied de page 4"/>
+          <p:cNvSpPr>
+            <a:spLocks noGrp="1"/>
+          </p:cNvSpPr>
+          <p:nvPr>
+            <p:ph type="ftr" sz="quarter" idx="11"/>
+          </p:nvPr>
+        </p:nvSpPr>
+        <p:spPr/>
+        <p:txBody>
+          <a:bodyPr/>
+          <a:lstStyle/>
+          <a:p>
+            <a:r>
+              <a:rPr lang="en-US" smtClean="0"/>
+              <a:t>Auteur : Jonathan Mayor </a:t>
+            </a:r>
+            <a:endParaRPr lang="en-US" dirty="0"/>
+          </a:p>
+        </p:txBody>
+      </p:sp>
+      <p:sp>
+        <p:nvSpPr>
+          <p:cNvPr id="7" name="Espace réservé de la date 6"/>
+          <p:cNvSpPr>
+            <a:spLocks noGrp="1"/>
+          </p:cNvSpPr>
+          <p:nvPr>
+            <p:ph type="dt" sz="half" idx="10"/>
+          </p:nvPr>
+        </p:nvSpPr>
+        <p:spPr/>
+        <p:txBody>
+          <a:bodyPr/>
+          <a:lstStyle/>
+          <a:p>
+            <a:fld id="{87DD1590-C177-4B9B-85FD-6C9D0E3E3D90}" type="datetime1">
+              <a:rPr lang="en-US" smtClean="0"/>
+              <a:t>6/27/2017</a:t>
+            </a:fld>
+            <a:endParaRPr lang="en-US" dirty="0"/>
+          </a:p>
+        </p:txBody>
+      </p:sp>
+      <p:pic>
+        <p:nvPicPr>
           <p:cNvPr id="3" name="Espace réservé du contenu 2"/>
-          <p:cNvSpPr>
-            <a:spLocks noGrp="1"/>
-          </p:cNvSpPr>
+          <p:cNvPicPr>
+            <a:picLocks noGrp="1" noChangeAspect="1"/>
+          </p:cNvPicPr>
           <p:nvPr>
             <p:ph idx="1"/>
           </p:nvPr>
-        </p:nvSpPr>
-        <p:spPr/>
-        <p:txBody>
-          <a:bodyPr/>
-          <a:lstStyle/>
-          <a:p>
-            <a:r>
-              <a:rPr lang="fr-CH" dirty="0" smtClean="0"/>
-              <a:t>Ressenti du projet </a:t>
-            </a:r>
-          </a:p>
-        </p:txBody>
-      </p:sp>
-      <p:sp>
-        <p:nvSpPr>
-          <p:cNvPr id="4" name="Espace réservé du pied de page 3"/>
-          <p:cNvSpPr>
-            <a:spLocks noGrp="1"/>
-          </p:cNvSpPr>
-          <p:nvPr>
-            <p:ph type="ftr" sz="quarter" idx="11"/>
-          </p:nvPr>
-        </p:nvSpPr>
-        <p:spPr/>
+        </p:nvPicPr>
+        <p:blipFill>
+          <a:blip r:embed="rId2">
+            <a:extLst>
+              <a:ext uri="{28A0092B-C50C-407E-A947-70E740481C1C}">
+                <a14:useLocalDpi xmlns:a14="http://schemas.microsoft.com/office/drawing/2010/main" val="0"/>
+              </a:ext>
+            </a:extLst>
+          </a:blip>
+          <a:stretch>
+            <a:fillRect/>
+          </a:stretch>
+        </p:blipFill>
+        <p:spPr>
+          <a:xfrm>
+            <a:off x="681038" y="2783930"/>
+            <a:ext cx="9613900" cy="2704602"/>
+          </a:xfrm>
+        </p:spPr>
+      </p:pic>
+      <p:sp>
+        <p:nvSpPr>
+          <p:cNvPr id="8" name="Espace réservé du numéro de diapositive 3"/>
+          <p:cNvSpPr>
+            <a:spLocks noGrp="1"/>
+          </p:cNvSpPr>
+          <p:nvPr>
+            <p:ph type="sldNum" sz="quarter" idx="12"/>
+          </p:nvPr>
+        </p:nvSpPr>
+        <p:spPr>
+          <a:xfrm>
+            <a:off x="10729455" y="753227"/>
+            <a:ext cx="1462545" cy="1090789"/>
+          </a:xfrm>
+        </p:spPr>
         <p:txBody>
           <a:bodyPr/>
           <a:lstStyle/>
           <a:p>
             <a:r>
               <a:rPr lang="en-US" dirty="0" smtClean="0"/>
-              <a:t>Auteur : Jonathan Mayor </a:t>
-            </a:r>
-            <a:endParaRPr lang="en-US" dirty="0"/>
-          </a:p>
-        </p:txBody>
-      </p:sp>
-      <p:sp>
-        <p:nvSpPr>
-          <p:cNvPr id="5" name="Espace réservé du numéro de diapositive 4"/>
-          <p:cNvSpPr>
-            <a:spLocks noGrp="1"/>
-          </p:cNvSpPr>
-          <p:nvPr>
-            <p:ph type="sldNum" sz="quarter" idx="12"/>
-          </p:nvPr>
-        </p:nvSpPr>
-        <p:spPr/>
-        <p:txBody>
-          <a:bodyPr/>
-          <a:lstStyle/>
-          <a:p>
-            <a:fld id="{6D22F896-40B5-4ADD-8801-0D06FADFA095}" type="slidenum">
-              <a:rPr lang="en-US" smtClean="0"/>
               <a:t>7</a:t>
-            </a:fld>
-            <a:endParaRPr lang="en-US" dirty="0"/>
-          </a:p>
-        </p:txBody>
-      </p:sp>
-      <p:sp>
-        <p:nvSpPr>
-          <p:cNvPr id="6" name="Espace réservé de la date 5"/>
-          <p:cNvSpPr>
-            <a:spLocks noGrp="1"/>
-          </p:cNvSpPr>
-          <p:nvPr>
-            <p:ph type="dt" sz="half" idx="10"/>
-          </p:nvPr>
-        </p:nvSpPr>
-        <p:spPr/>
-        <p:txBody>
-          <a:bodyPr/>
-          <a:lstStyle/>
-          <a:p>
-            <a:fld id="{8BE822C4-0538-4B21-8295-7DF455DAF668}" type="datetime1">
-              <a:rPr lang="en-US" smtClean="0"/>
-              <a:t>6/26/2017</a:t>
-            </a:fld>
+            </a:r>
+            <a:r>
+              <a:rPr lang="en-US" dirty="0" smtClean="0"/>
+              <a:t>/10</a:t>
+            </a:r>
             <a:endParaRPr lang="en-US" dirty="0"/>
           </a:p>
         </p:txBody>
@@ -9670,7 +9899,7 @@
     </p:spTree>
     <p:extLst>
       <p:ext uri="{BB962C8B-B14F-4D97-AF65-F5344CB8AC3E}">
-        <p14:creationId xmlns:p14="http://schemas.microsoft.com/office/powerpoint/2010/main" val="2860511628"/>
+        <p14:creationId xmlns:p14="http://schemas.microsoft.com/office/powerpoint/2010/main" val="2072395822"/>
       </p:ext>
     </p:extLst>
   </p:cSld>
@@ -9721,7 +9950,7 @@
           <a:p>
             <a:r>
               <a:rPr lang="fr-CH" dirty="0" smtClean="0"/>
-              <a:t>Question ?</a:t>
+              <a:t>GIT</a:t>
             </a:r>
             <a:endParaRPr lang="fr-CH" dirty="0"/>
           </a:p>
@@ -9729,7 +9958,7 @@
       </p:sp>
       <p:sp>
         <p:nvSpPr>
-          <p:cNvPr id="3" name="Espace réservé du pied de page 2"/>
+          <p:cNvPr id="5" name="Espace réservé du pied de page 4"/>
           <p:cNvSpPr>
             <a:spLocks noGrp="1"/>
           </p:cNvSpPr>
@@ -9752,7 +9981,121 @@
       </p:sp>
       <p:sp>
         <p:nvSpPr>
-          <p:cNvPr id="4" name="Espace réservé du numéro de diapositive 3"/>
+          <p:cNvPr id="7" name="Espace réservé de la date 6"/>
+          <p:cNvSpPr>
+            <a:spLocks noGrp="1"/>
+          </p:cNvSpPr>
+          <p:nvPr>
+            <p:ph type="dt" sz="half" idx="10"/>
+          </p:nvPr>
+        </p:nvSpPr>
+        <p:spPr/>
+        <p:txBody>
+          <a:bodyPr/>
+          <a:lstStyle/>
+          <a:p>
+            <a:fld id="{C9ADEA2C-D6EF-446C-A2A2-A4695D0BCC88}" type="datetime1">
+              <a:rPr lang="en-US" smtClean="0"/>
+              <a:t>6/27/2017</a:t>
+            </a:fld>
+            <a:endParaRPr lang="en-US" dirty="0"/>
+          </a:p>
+        </p:txBody>
+      </p:sp>
+      <p:pic>
+        <p:nvPicPr>
+          <p:cNvPr id="8" name="Espace réservé du contenu 7"/>
+          <p:cNvPicPr>
+            <a:picLocks noGrp="1" noChangeAspect="1"/>
+          </p:cNvPicPr>
+          <p:nvPr>
+            <p:ph idx="1"/>
+          </p:nvPr>
+        </p:nvPicPr>
+        <p:blipFill>
+          <a:blip r:embed="rId2">
+            <a:extLst>
+              <a:ext uri="{28A0092B-C50C-407E-A947-70E740481C1C}">
+                <a14:useLocalDpi xmlns:a14="http://schemas.microsoft.com/office/drawing/2010/main" val="0"/>
+              </a:ext>
+            </a:extLst>
+          </a:blip>
+          <a:stretch>
+            <a:fillRect/>
+          </a:stretch>
+        </p:blipFill>
+        <p:spPr>
+          <a:xfrm>
+            <a:off x="680321" y="2337324"/>
+            <a:ext cx="3822755" cy="3598863"/>
+          </a:xfrm>
+        </p:spPr>
+      </p:pic>
+      <p:pic>
+        <p:nvPicPr>
+          <p:cNvPr id="9" name="Image 8"/>
+          <p:cNvPicPr>
+            <a:picLocks noChangeAspect="1"/>
+          </p:cNvPicPr>
+          <p:nvPr/>
+        </p:nvPicPr>
+        <p:blipFill>
+          <a:blip r:embed="rId3">
+            <a:extLst>
+              <a:ext uri="{28A0092B-C50C-407E-A947-70E740481C1C}">
+                <a14:useLocalDpi xmlns:a14="http://schemas.microsoft.com/office/drawing/2010/main" val="0"/>
+              </a:ext>
+            </a:extLst>
+          </a:blip>
+          <a:stretch>
+            <a:fillRect/>
+          </a:stretch>
+        </p:blipFill>
+        <p:spPr>
+          <a:xfrm>
+            <a:off x="6050024" y="2613412"/>
+            <a:ext cx="3658111" cy="847843"/>
+          </a:xfrm>
+          <a:prstGeom prst="rect">
+            <a:avLst/>
+          </a:prstGeom>
+        </p:spPr>
+      </p:pic>
+      <p:cxnSp>
+        <p:nvCxnSpPr>
+          <p:cNvPr id="11" name="Connecteur droit 10"/>
+          <p:cNvCxnSpPr>
+            <a:endCxn id="9" idx="1"/>
+          </p:cNvCxnSpPr>
+          <p:nvPr/>
+        </p:nvCxnSpPr>
+        <p:spPr>
+          <a:xfrm flipV="1">
+            <a:off x="4503076" y="3037334"/>
+            <a:ext cx="1546948" cy="423921"/>
+          </a:xfrm>
+          <a:prstGeom prst="line">
+            <a:avLst/>
+          </a:prstGeom>
+        </p:spPr>
+        <p:style>
+          <a:lnRef idx="3">
+            <a:schemeClr val="accent5"/>
+          </a:lnRef>
+          <a:fillRef idx="0">
+            <a:schemeClr val="accent5"/>
+          </a:fillRef>
+          <a:effectRef idx="2">
+            <a:schemeClr val="accent5"/>
+          </a:effectRef>
+          <a:fontRef idx="minor">
+            <a:schemeClr val="tx1"/>
+          </a:fontRef>
+        </p:style>
+      </p:cxnSp>
+      <p:sp>
+        <p:nvSpPr>
+          <p:cNvPr id="12" name="Espace réservé du numéro de diapositive 3"/>
           <p:cNvSpPr>
             <a:spLocks noGrp="1"/>
           </p:cNvSpPr>
@@ -9760,38 +10103,20 @@
             <p:ph type="sldNum" sz="quarter" idx="12"/>
           </p:nvPr>
         </p:nvSpPr>
-        <p:spPr/>
-        <p:txBody>
-          <a:bodyPr/>
-          <a:lstStyle/>
-          <a:p>
-            <a:fld id="{6D22F896-40B5-4ADD-8801-0D06FADFA095}" type="slidenum">
-              <a:rPr lang="en-US" smtClean="0"/>
-              <a:t>8</a:t>
-            </a:fld>
-            <a:endParaRPr lang="en-US" dirty="0"/>
-          </a:p>
-        </p:txBody>
-      </p:sp>
-      <p:sp>
-        <p:nvSpPr>
-          <p:cNvPr id="5" name="Espace réservé de la date 4"/>
-          <p:cNvSpPr>
-            <a:spLocks noGrp="1"/>
-          </p:cNvSpPr>
-          <p:nvPr>
-            <p:ph type="dt" sz="half" idx="10"/>
-          </p:nvPr>
-        </p:nvSpPr>
-        <p:spPr/>
-        <p:txBody>
-          <a:bodyPr/>
-          <a:lstStyle/>
-          <a:p>
-            <a:fld id="{CE59B688-AE9A-4FD8-8492-7027152EAA6E}" type="datetime1">
-              <a:rPr lang="en-US" smtClean="0"/>
-              <a:t>6/26/2017</a:t>
-            </a:fld>
+        <p:spPr>
+          <a:xfrm>
+            <a:off x="10729455" y="753227"/>
+            <a:ext cx="1462545" cy="1090789"/>
+          </a:xfrm>
+        </p:spPr>
+        <p:txBody>
+          <a:bodyPr/>
+          <a:lstStyle/>
+          <a:p>
+            <a:r>
+              <a:rPr lang="en-US" dirty="0" smtClean="0"/>
+              <a:t>8/10</a:t>
+            </a:r>
             <a:endParaRPr lang="en-US" dirty="0"/>
           </a:p>
         </p:txBody>
@@ -9799,7 +10124,168 @@
     </p:spTree>
     <p:extLst>
       <p:ext uri="{BB962C8B-B14F-4D97-AF65-F5344CB8AC3E}">
-        <p14:creationId xmlns:p14="http://schemas.microsoft.com/office/powerpoint/2010/main" val="1462199348"/>
+        <p14:creationId xmlns:p14="http://schemas.microsoft.com/office/powerpoint/2010/main" val="2276822462"/>
+      </p:ext>
+    </p:extLst>
+  </p:cSld>
+  <p:clrMapOvr>
+    <a:masterClrMapping/>
+  </p:clrMapOvr>
+  <p:timing>
+    <p:tnLst>
+      <p:par>
+        <p:cTn id="1" dur="indefinite" restart="never" nodeType="tmRoot"/>
+      </p:par>
+    </p:tnLst>
+  </p:timing>
+</p:sld>
+</file>
+
+<file path=ppt/slides/slide9.xml><?xml version="1.0" encoding="utf-8"?>
+<p:sld xmlns:a="http://schemas.openxmlformats.org/drawingml/2006/main" xmlns:r="http://schemas.openxmlformats.org/officeDocument/2006/relationships" xmlns:p="http://schemas.openxmlformats.org/presentationml/2006/main">
+  <p:cSld>
+    <p:spTree>
+      <p:nvGrpSpPr>
+        <p:cNvPr id="1" name=""/>
+        <p:cNvGrpSpPr/>
+        <p:nvPr/>
+      </p:nvGrpSpPr>
+      <p:grpSpPr>
+        <a:xfrm>
+          <a:off x="0" y="0"/>
+          <a:ext cx="0" cy="0"/>
+          <a:chOff x="0" y="0"/>
+          <a:chExt cx="0" cy="0"/>
+        </a:xfrm>
+      </p:grpSpPr>
+      <p:sp>
+        <p:nvSpPr>
+          <p:cNvPr id="2" name="Titre 1"/>
+          <p:cNvSpPr>
+            <a:spLocks noGrp="1"/>
+          </p:cNvSpPr>
+          <p:nvPr>
+            <p:ph type="title"/>
+          </p:nvPr>
+        </p:nvSpPr>
+        <p:spPr/>
+        <p:txBody>
+          <a:bodyPr/>
+          <a:lstStyle/>
+          <a:p>
+            <a:r>
+              <a:rPr lang="fr-CH" dirty="0" smtClean="0"/>
+              <a:t>Conclusion</a:t>
+            </a:r>
+            <a:endParaRPr lang="fr-CH" dirty="0"/>
+          </a:p>
+        </p:txBody>
+      </p:sp>
+      <p:sp>
+        <p:nvSpPr>
+          <p:cNvPr id="3" name="Espace réservé du contenu 2"/>
+          <p:cNvSpPr>
+            <a:spLocks noGrp="1"/>
+          </p:cNvSpPr>
+          <p:nvPr>
+            <p:ph idx="1"/>
+          </p:nvPr>
+        </p:nvSpPr>
+        <p:spPr/>
+        <p:txBody>
+          <a:bodyPr/>
+          <a:lstStyle/>
+          <a:p>
+            <a:r>
+              <a:rPr lang="fr-CH" dirty="0" smtClean="0"/>
+              <a:t>Ressenti du </a:t>
+            </a:r>
+            <a:r>
+              <a:rPr lang="fr-CH" dirty="0" smtClean="0"/>
+              <a:t>projet </a:t>
+            </a:r>
+            <a:endParaRPr lang="fr-CH" dirty="0" smtClean="0"/>
+          </a:p>
+        </p:txBody>
+      </p:sp>
+      <p:sp>
+        <p:nvSpPr>
+          <p:cNvPr id="4" name="Espace réservé du pied de page 3"/>
+          <p:cNvSpPr>
+            <a:spLocks noGrp="1"/>
+          </p:cNvSpPr>
+          <p:nvPr>
+            <p:ph type="ftr" sz="quarter" idx="11"/>
+          </p:nvPr>
+        </p:nvSpPr>
+        <p:spPr/>
+        <p:txBody>
+          <a:bodyPr/>
+          <a:lstStyle/>
+          <a:p>
+            <a:r>
+              <a:rPr lang="en-US" dirty="0" smtClean="0"/>
+              <a:t>Auteur : Jonathan Mayor </a:t>
+            </a:r>
+            <a:endParaRPr lang="en-US" dirty="0"/>
+          </a:p>
+        </p:txBody>
+      </p:sp>
+      <p:sp>
+        <p:nvSpPr>
+          <p:cNvPr id="6" name="Espace réservé de la date 5"/>
+          <p:cNvSpPr>
+            <a:spLocks noGrp="1"/>
+          </p:cNvSpPr>
+          <p:nvPr>
+            <p:ph type="dt" sz="half" idx="10"/>
+          </p:nvPr>
+        </p:nvSpPr>
+        <p:spPr/>
+        <p:txBody>
+          <a:bodyPr/>
+          <a:lstStyle/>
+          <a:p>
+            <a:fld id="{BA5AEC99-7A3F-411C-948E-2F1B67AA967E}" type="datetime1">
+              <a:rPr lang="en-US" smtClean="0"/>
+              <a:t>6/27/2017</a:t>
+            </a:fld>
+            <a:endParaRPr lang="en-US" dirty="0"/>
+          </a:p>
+        </p:txBody>
+      </p:sp>
+      <p:sp>
+        <p:nvSpPr>
+          <p:cNvPr id="9" name="Espace réservé du numéro de diapositive 3"/>
+          <p:cNvSpPr>
+            <a:spLocks noGrp="1"/>
+          </p:cNvSpPr>
+          <p:nvPr>
+            <p:ph type="sldNum" sz="quarter" idx="12"/>
+          </p:nvPr>
+        </p:nvSpPr>
+        <p:spPr>
+          <a:xfrm>
+            <a:off x="10729455" y="753227"/>
+            <a:ext cx="1462545" cy="1090789"/>
+          </a:xfrm>
+        </p:spPr>
+        <p:txBody>
+          <a:bodyPr/>
+          <a:lstStyle/>
+          <a:p>
+            <a:r>
+              <a:rPr lang="en-US" dirty="0" smtClean="0"/>
+              <a:t>9/10</a:t>
+            </a:r>
+            <a:endParaRPr lang="en-US" dirty="0"/>
+          </a:p>
+        </p:txBody>
+      </p:sp>
+    </p:spTree>
+    <p:extLst>
+      <p:ext uri="{BB962C8B-B14F-4D97-AF65-F5344CB8AC3E}">
+        <p14:creationId xmlns:p14="http://schemas.microsoft.com/office/powerpoint/2010/main" val="2860511628"/>
       </p:ext>
     </p:extLst>
   </p:cSld>

</xml_diff>